<commit_message>
Fix bugs in slides
</commit_message>
<xml_diff>
--- a/2-Design/design-slides-1.pptx
+++ b/2-Design/design-slides-1.pptx
@@ -31692,14 +31692,10 @@
             </a:pPr>
             <a:r>
               <a:rPr lang="ru-RU" dirty="0"/>
-              <a:t>Еще миллион </a:t>
-            </a:r>
-            <a:r>
-              <a:rPr lang="ru-RU"/>
-              <a:t>возможностей </a:t>
-            </a:r>
-            <a:r>
-              <a:rPr lang="ru-RU" smtClean="0"/>
+              <a:t>Еще миллион возможностей </a:t>
+            </a:r>
+            <a:r>
+              <a:rPr lang="ru-RU" dirty="0" smtClean="0"/>
               <a:t>конфигурирования…</a:t>
             </a:r>
             <a:endParaRPr lang="en-US" dirty="0" smtClean="0">
@@ -35661,7 +35657,12 @@
             <p:ph type="title"/>
           </p:nvPr>
         </p:nvSpPr>
-        <p:spPr/>
+        <p:spPr>
+          <a:xfrm>
+            <a:off x="628650" y="383598"/>
+            <a:ext cx="7886700" cy="1325563"/>
+          </a:xfrm>
+        </p:spPr>
         <p:txBody>
           <a:bodyPr/>
           <a:lstStyle/>

</xml_diff>